<commit_message>
Removing interactions and chronographs from data model specifications
</commit_message>
<xml_diff>
--- a/Documents/LEGEND data model V08.pptx
+++ b/Documents/LEGEND data model V08.pptx
@@ -241,7 +241,7 @@
           <a:p>
             <a:fld id="{365C9929-806C-4F40-9578-CE1B791979AC}" type="datetimeFigureOut">
               <a:rPr lang="en-US" smtClean="0"/>
-              <a:t>1/18/2019</a:t>
+              <a:t>4/4/2019</a:t>
             </a:fld>
             <a:endParaRPr lang="en-US"/>
           </a:p>
@@ -409,7 +409,7 @@
           <a:p>
             <a:fld id="{365C9929-806C-4F40-9578-CE1B791979AC}" type="datetimeFigureOut">
               <a:rPr lang="en-US" smtClean="0"/>
-              <a:t>1/18/2019</a:t>
+              <a:t>4/4/2019</a:t>
             </a:fld>
             <a:endParaRPr lang="en-US"/>
           </a:p>
@@ -587,7 +587,7 @@
           <a:p>
             <a:fld id="{365C9929-806C-4F40-9578-CE1B791979AC}" type="datetimeFigureOut">
               <a:rPr lang="en-US" smtClean="0"/>
-              <a:t>1/18/2019</a:t>
+              <a:t>4/4/2019</a:t>
             </a:fld>
             <a:endParaRPr lang="en-US"/>
           </a:p>
@@ -755,7 +755,7 @@
           <a:p>
             <a:fld id="{365C9929-806C-4F40-9578-CE1B791979AC}" type="datetimeFigureOut">
               <a:rPr lang="en-US" smtClean="0"/>
-              <a:t>1/18/2019</a:t>
+              <a:t>4/4/2019</a:t>
             </a:fld>
             <a:endParaRPr lang="en-US"/>
           </a:p>
@@ -1000,7 +1000,7 @@
           <a:p>
             <a:fld id="{365C9929-806C-4F40-9578-CE1B791979AC}" type="datetimeFigureOut">
               <a:rPr lang="en-US" smtClean="0"/>
-              <a:t>1/18/2019</a:t>
+              <a:t>4/4/2019</a:t>
             </a:fld>
             <a:endParaRPr lang="en-US"/>
           </a:p>
@@ -1229,7 +1229,7 @@
           <a:p>
             <a:fld id="{365C9929-806C-4F40-9578-CE1B791979AC}" type="datetimeFigureOut">
               <a:rPr lang="en-US" smtClean="0"/>
-              <a:t>1/18/2019</a:t>
+              <a:t>4/4/2019</a:t>
             </a:fld>
             <a:endParaRPr lang="en-US"/>
           </a:p>
@@ -1593,7 +1593,7 @@
           <a:p>
             <a:fld id="{365C9929-806C-4F40-9578-CE1B791979AC}" type="datetimeFigureOut">
               <a:rPr lang="en-US" smtClean="0"/>
-              <a:t>1/18/2019</a:t>
+              <a:t>4/4/2019</a:t>
             </a:fld>
             <a:endParaRPr lang="en-US"/>
           </a:p>
@@ -1710,7 +1710,7 @@
           <a:p>
             <a:fld id="{365C9929-806C-4F40-9578-CE1B791979AC}" type="datetimeFigureOut">
               <a:rPr lang="en-US" smtClean="0"/>
-              <a:t>1/18/2019</a:t>
+              <a:t>4/4/2019</a:t>
             </a:fld>
             <a:endParaRPr lang="en-US"/>
           </a:p>
@@ -1805,7 +1805,7 @@
           <a:p>
             <a:fld id="{365C9929-806C-4F40-9578-CE1B791979AC}" type="datetimeFigureOut">
               <a:rPr lang="en-US" smtClean="0"/>
-              <a:t>1/18/2019</a:t>
+              <a:t>4/4/2019</a:t>
             </a:fld>
             <a:endParaRPr lang="en-US"/>
           </a:p>
@@ -2080,7 +2080,7 @@
           <a:p>
             <a:fld id="{365C9929-806C-4F40-9578-CE1B791979AC}" type="datetimeFigureOut">
               <a:rPr lang="en-US" smtClean="0"/>
-              <a:t>1/18/2019</a:t>
+              <a:t>4/4/2019</a:t>
             </a:fld>
             <a:endParaRPr lang="en-US"/>
           </a:p>
@@ -2332,7 +2332,7 @@
           <a:p>
             <a:fld id="{365C9929-806C-4F40-9578-CE1B791979AC}" type="datetimeFigureOut">
               <a:rPr lang="en-US" smtClean="0"/>
-              <a:t>1/18/2019</a:t>
+              <a:t>4/4/2019</a:t>
             </a:fld>
             <a:endParaRPr lang="en-US"/>
           </a:p>
@@ -2543,7 +2543,7 @@
           <a:p>
             <a:fld id="{365C9929-806C-4F40-9578-CE1B791979AC}" type="datetimeFigureOut">
               <a:rPr lang="en-US" smtClean="0"/>
-              <a:t>1/18/2019</a:t>
+              <a:t>4/4/2019</a:t>
             </a:fld>
             <a:endParaRPr lang="en-US"/>
           </a:p>
@@ -2956,8 +2956,8 @@
         </p:nvSpPr>
         <p:spPr>
           <a:xfrm>
-            <a:off x="3541987" y="267076"/>
-            <a:ext cx="3239996" cy="4392616"/>
+            <a:off x="3469348" y="267076"/>
+            <a:ext cx="3124555" cy="4392616"/>
           </a:xfrm>
           <a:prstGeom prst="rect">
             <a:avLst/>
@@ -3005,8 +3005,8 @@
         </p:nvSpPr>
         <p:spPr>
           <a:xfrm>
-            <a:off x="50906" y="261556"/>
-            <a:ext cx="3356923" cy="889615"/>
+            <a:off x="50907" y="261556"/>
+            <a:ext cx="3299016" cy="889615"/>
           </a:xfrm>
           <a:prstGeom prst="rect">
             <a:avLst/>
@@ -3053,8 +3053,8 @@
         </p:nvSpPr>
         <p:spPr>
           <a:xfrm>
-            <a:off x="8719892" y="261555"/>
-            <a:ext cx="1840889" cy="6553849"/>
+            <a:off x="8359123" y="261555"/>
+            <a:ext cx="1812867" cy="6482145"/>
           </a:xfrm>
           <a:prstGeom prst="rect">
             <a:avLst/>
@@ -3102,8 +3102,8 @@
         </p:nvSpPr>
         <p:spPr>
           <a:xfrm>
-            <a:off x="6869060" y="261555"/>
-            <a:ext cx="1763780" cy="5288640"/>
+            <a:off x="6649594" y="261555"/>
+            <a:ext cx="1653838" cy="5102925"/>
           </a:xfrm>
           <a:prstGeom prst="rect">
             <a:avLst/>
@@ -3151,8 +3151,8 @@
         </p:nvSpPr>
         <p:spPr>
           <a:xfrm>
-            <a:off x="50906" y="1215137"/>
-            <a:ext cx="3356923" cy="1442870"/>
+            <a:off x="50907" y="1215137"/>
+            <a:ext cx="3299016" cy="1442870"/>
           </a:xfrm>
           <a:prstGeom prst="rect">
             <a:avLst/>
@@ -3199,8 +3199,8 @@
         </p:nvSpPr>
         <p:spPr>
           <a:xfrm>
-            <a:off x="57608" y="4659692"/>
-            <a:ext cx="3356923" cy="2019404"/>
+            <a:off x="57609" y="4659692"/>
+            <a:ext cx="3299016" cy="2019404"/>
           </a:xfrm>
           <a:prstGeom prst="rect">
             <a:avLst/>
@@ -3247,8 +3247,8 @@
         </p:nvSpPr>
         <p:spPr>
           <a:xfrm>
-            <a:off x="51891" y="2733342"/>
-            <a:ext cx="3356923" cy="1844338"/>
+            <a:off x="51892" y="2733342"/>
+            <a:ext cx="3299016" cy="1844338"/>
           </a:xfrm>
           <a:prstGeom prst="rect">
             <a:avLst/>
@@ -3296,7 +3296,7 @@
         <p:spPr>
           <a:xfrm>
             <a:off x="118065" y="2914135"/>
-            <a:ext cx="1598932" cy="1061829"/>
+            <a:ext cx="1547887" cy="1061829"/>
           </a:xfrm>
           <a:prstGeom prst="rect">
             <a:avLst/>
@@ -3394,8 +3394,8 @@
         </p:nvSpPr>
         <p:spPr>
           <a:xfrm>
-            <a:off x="1764071" y="2910497"/>
-            <a:ext cx="1567056" cy="1061829"/>
+            <a:off x="1719173" y="2910497"/>
+            <a:ext cx="1564166" cy="1061829"/>
           </a:xfrm>
           <a:prstGeom prst="rect">
             <a:avLst/>
@@ -3493,8 +3493,8 @@
         </p:nvSpPr>
         <p:spPr>
           <a:xfrm>
-            <a:off x="3618435" y="2106851"/>
-            <a:ext cx="1366754" cy="923330"/>
+            <a:off x="3545796" y="2106851"/>
+            <a:ext cx="1309839" cy="923330"/>
           </a:xfrm>
           <a:prstGeom prst="rect">
             <a:avLst/>
@@ -3585,7 +3585,7 @@
         <p:spPr>
           <a:xfrm>
             <a:off x="123782" y="4837160"/>
-            <a:ext cx="1598932" cy="923330"/>
+            <a:ext cx="1541185" cy="923330"/>
           </a:xfrm>
           <a:prstGeom prst="rect">
             <a:avLst/>
@@ -3673,8 +3673,8 @@
         </p:nvSpPr>
         <p:spPr>
           <a:xfrm>
-            <a:off x="3617160" y="456757"/>
-            <a:ext cx="1363890" cy="784830"/>
+            <a:off x="3544521" y="456757"/>
+            <a:ext cx="1307094" cy="784830"/>
           </a:xfrm>
           <a:prstGeom prst="rect">
             <a:avLst/>
@@ -3755,7 +3755,7 @@
         <p:spPr>
           <a:xfrm>
             <a:off x="117080" y="1398568"/>
-            <a:ext cx="1598932" cy="646331"/>
+            <a:ext cx="1548872" cy="646331"/>
           </a:xfrm>
           <a:prstGeom prst="rect">
             <a:avLst/>
@@ -3823,8 +3823,8 @@
         </p:nvSpPr>
         <p:spPr>
           <a:xfrm>
-            <a:off x="5047698" y="3357577"/>
-            <a:ext cx="1640593" cy="784830"/>
+            <a:off x="4911326" y="3354535"/>
+            <a:ext cx="1603063" cy="784830"/>
           </a:xfrm>
           <a:prstGeom prst="rect">
             <a:avLst/>
@@ -3904,8 +3904,8 @@
         </p:nvSpPr>
         <p:spPr>
           <a:xfrm>
-            <a:off x="1774145" y="1398568"/>
-            <a:ext cx="1562066" cy="507831"/>
+            <a:off x="1729247" y="1398568"/>
+            <a:ext cx="1559185" cy="507831"/>
           </a:xfrm>
           <a:prstGeom prst="rect">
             <a:avLst/>
@@ -3969,8 +3969,8 @@
         </p:nvSpPr>
         <p:spPr>
           <a:xfrm>
-            <a:off x="6951460" y="453934"/>
-            <a:ext cx="1583261" cy="3554819"/>
+            <a:off x="6738007" y="453934"/>
+            <a:ext cx="1485914" cy="3554819"/>
           </a:xfrm>
           <a:prstGeom prst="rect">
             <a:avLst/>
@@ -4250,8 +4250,8 @@
         </p:nvSpPr>
         <p:spPr>
           <a:xfrm>
-            <a:off x="117080" y="438004"/>
-            <a:ext cx="1609103" cy="646331"/>
+            <a:off x="117081" y="438004"/>
+            <a:ext cx="1548872" cy="646331"/>
           </a:xfrm>
           <a:prstGeom prst="rect">
             <a:avLst/>
@@ -4320,7 +4320,7 @@
         <p:spPr>
           <a:xfrm>
             <a:off x="123782" y="5813252"/>
-            <a:ext cx="1598932" cy="784830"/>
+            <a:ext cx="1541185" cy="784830"/>
           </a:xfrm>
           <a:prstGeom prst="rect">
             <a:avLst/>
@@ -4398,8 +4398,8 @@
         </p:nvSpPr>
         <p:spPr>
           <a:xfrm>
-            <a:off x="1765560" y="4835421"/>
-            <a:ext cx="1567056" cy="1061829"/>
+            <a:off x="1720662" y="4835421"/>
+            <a:ext cx="1564166" cy="1061829"/>
           </a:xfrm>
           <a:prstGeom prst="rect">
             <a:avLst/>
@@ -4497,8 +4497,8 @@
         </p:nvSpPr>
         <p:spPr>
           <a:xfrm>
-            <a:off x="8795448" y="454111"/>
-            <a:ext cx="1681859" cy="2031325"/>
+            <a:off x="8434680" y="454111"/>
+            <a:ext cx="1663478" cy="1892826"/>
           </a:xfrm>
           <a:prstGeom prst="rect">
             <a:avLst/>
@@ -4585,16 +4585,6 @@
             </a:pPr>
             <a:r>
               <a:rPr lang="en-US" sz="900" u="sng" noProof="1"/>
-              <a:t>[interaction_covariate_id]</a:t>
-            </a:r>
-          </a:p>
-          <a:p>
-            <a:pPr marL="171450" indent="-171450">
-              <a:buFontTx/>
-              <a:buChar char="-"/>
-            </a:pPr>
-            <a:r>
-              <a:rPr lang="en-US" sz="900" u="sng" noProof="1"/>
               <a:t>covariate_id</a:t>
             </a:r>
           </a:p>
@@ -4668,8 +4658,8 @@
         </p:nvSpPr>
         <p:spPr>
           <a:xfrm>
-            <a:off x="8794114" y="2523712"/>
-            <a:ext cx="1681859" cy="1061829"/>
+            <a:off x="8434680" y="2385213"/>
+            <a:ext cx="1663478" cy="1061829"/>
           </a:xfrm>
           <a:prstGeom prst="rect">
             <a:avLst/>
@@ -4835,8 +4825,8 @@
         </p:nvSpPr>
         <p:spPr>
           <a:xfrm>
-            <a:off x="6951462" y="4097972"/>
-            <a:ext cx="1583262" cy="1338828"/>
+            <a:off x="6738006" y="4042472"/>
+            <a:ext cx="1485915" cy="1200329"/>
           </a:xfrm>
           <a:prstGeom prst="rect">
             <a:avLst/>
@@ -4893,16 +4883,6 @@
             </a:pPr>
             <a:r>
               <a:rPr lang="en-US" sz="900" u="sng" noProof="1"/>
-              <a:t>[interaction_covariate_id]</a:t>
-            </a:r>
-          </a:p>
-          <a:p>
-            <a:pPr marL="171450" indent="-171450">
-              <a:buFontTx/>
-              <a:buChar char="-"/>
-            </a:pPr>
-            <a:r>
-              <a:rPr lang="en-US" sz="900" u="sng" noProof="1"/>
               <a:t>outcome_id</a:t>
             </a:r>
           </a:p>
@@ -4957,7 +4937,7 @@
         <p:spPr>
           <a:xfrm>
             <a:off x="117080" y="2089989"/>
-            <a:ext cx="1598932" cy="507831"/>
+            <a:ext cx="1548872" cy="507831"/>
           </a:xfrm>
           <a:prstGeom prst="rect">
             <a:avLst/>
@@ -5021,8 +5001,8 @@
         </p:nvSpPr>
         <p:spPr>
           <a:xfrm>
-            <a:off x="8794114" y="3623817"/>
-            <a:ext cx="1681859" cy="2169825"/>
+            <a:off x="8434680" y="3485318"/>
+            <a:ext cx="1663478" cy="2169825"/>
           </a:xfrm>
           <a:prstGeom prst="rect">
             <a:avLst/>
@@ -5202,8 +5182,8 @@
         </p:nvSpPr>
         <p:spPr>
           <a:xfrm>
-            <a:off x="8794114" y="5831918"/>
-            <a:ext cx="1681859" cy="923330"/>
+            <a:off x="8434680" y="5693419"/>
+            <a:ext cx="1663478" cy="923330"/>
           </a:xfrm>
           <a:prstGeom prst="rect">
             <a:avLst/>
@@ -5326,7 +5306,7 @@
         </p:nvSpPr>
         <p:spPr>
           <a:xfrm>
-            <a:off x="3623820" y="5745817"/>
+            <a:off x="3526450" y="5898724"/>
             <a:ext cx="3067453" cy="784830"/>
           </a:xfrm>
           <a:prstGeom prst="rect">
@@ -5377,7 +5357,7 @@
         </p:nvSpPr>
         <p:spPr>
           <a:xfrm>
-            <a:off x="6872828" y="227836"/>
+            <a:off x="6653362" y="227836"/>
             <a:ext cx="777777" cy="230832"/>
           </a:xfrm>
           <a:prstGeom prst="rect">
@@ -5410,7 +5390,7 @@
         </p:nvSpPr>
         <p:spPr>
           <a:xfrm>
-            <a:off x="8719891" y="223279"/>
+            <a:off x="8359122" y="223279"/>
             <a:ext cx="723275" cy="230832"/>
           </a:xfrm>
           <a:prstGeom prst="rect">
@@ -5472,7 +5452,7 @@
         </p:nvSpPr>
         <p:spPr>
           <a:xfrm>
-            <a:off x="6139278" y="-59845"/>
+            <a:off x="5786956" y="-66393"/>
             <a:ext cx="1855444" cy="369332"/>
           </a:xfrm>
           <a:prstGeom prst="rect">
@@ -5501,7 +5481,7 @@
         </p:nvCxnSpPr>
         <p:spPr>
           <a:xfrm>
-            <a:off x="3472109" y="88900"/>
+            <a:off x="3409635" y="88900"/>
             <a:ext cx="0" cy="6769100"/>
           </a:xfrm>
           <a:prstGeom prst="line">
@@ -5567,7 +5547,7 @@
         </p:nvSpPr>
         <p:spPr>
           <a:xfrm>
-            <a:off x="3541987" y="228797"/>
+            <a:off x="3469348" y="228797"/>
             <a:ext cx="652743" cy="230832"/>
           </a:xfrm>
           <a:prstGeom prst="rect">
@@ -5600,8 +5580,8 @@
         </p:nvSpPr>
         <p:spPr>
           <a:xfrm>
-            <a:off x="3618435" y="1283742"/>
-            <a:ext cx="1366754" cy="784830"/>
+            <a:off x="3545796" y="1283742"/>
+            <a:ext cx="1309839" cy="784830"/>
           </a:xfrm>
           <a:prstGeom prst="rect">
             <a:avLst/>
@@ -5681,8 +5661,8 @@
         </p:nvSpPr>
         <p:spPr>
           <a:xfrm>
-            <a:off x="3618435" y="3074628"/>
-            <a:ext cx="1366754" cy="1477328"/>
+            <a:off x="3545796" y="3074628"/>
+            <a:ext cx="1309839" cy="1477328"/>
           </a:xfrm>
           <a:prstGeom prst="rect">
             <a:avLst/>
@@ -5820,7 +5800,7 @@
         <p:spPr>
           <a:xfrm>
             <a:off x="117080" y="4013315"/>
-            <a:ext cx="1598932" cy="507831"/>
+            <a:ext cx="1547887" cy="507831"/>
           </a:xfrm>
           <a:prstGeom prst="rect">
             <a:avLst/>
@@ -5884,8 +5864,8 @@
         </p:nvSpPr>
         <p:spPr>
           <a:xfrm>
-            <a:off x="5047699" y="456976"/>
-            <a:ext cx="1640593" cy="2862322"/>
+            <a:off x="4911327" y="453934"/>
+            <a:ext cx="1603063" cy="2862322"/>
           </a:xfrm>
           <a:prstGeom prst="rect">
             <a:avLst/>

</xml_diff>

<commit_message>
Regenerating chord diagrams for methods paper. Updating guiding principles
</commit_message>
<xml_diff>
--- a/Documents/LEGEND data model V08.pptx
+++ b/Documents/LEGEND data model V08.pptx
@@ -241,7 +241,7 @@
           <a:p>
             <a:fld id="{365C9929-806C-4F40-9578-CE1B791979AC}" type="datetimeFigureOut">
               <a:rPr lang="en-US" smtClean="0"/>
-              <a:t>4/4/2019</a:t>
+              <a:t>4/5/2019</a:t>
             </a:fld>
             <a:endParaRPr lang="en-US"/>
           </a:p>
@@ -409,7 +409,7 @@
           <a:p>
             <a:fld id="{365C9929-806C-4F40-9578-CE1B791979AC}" type="datetimeFigureOut">
               <a:rPr lang="en-US" smtClean="0"/>
-              <a:t>4/4/2019</a:t>
+              <a:t>4/5/2019</a:t>
             </a:fld>
             <a:endParaRPr lang="en-US"/>
           </a:p>
@@ -587,7 +587,7 @@
           <a:p>
             <a:fld id="{365C9929-806C-4F40-9578-CE1B791979AC}" type="datetimeFigureOut">
               <a:rPr lang="en-US" smtClean="0"/>
-              <a:t>4/4/2019</a:t>
+              <a:t>4/5/2019</a:t>
             </a:fld>
             <a:endParaRPr lang="en-US"/>
           </a:p>
@@ -755,7 +755,7 @@
           <a:p>
             <a:fld id="{365C9929-806C-4F40-9578-CE1B791979AC}" type="datetimeFigureOut">
               <a:rPr lang="en-US" smtClean="0"/>
-              <a:t>4/4/2019</a:t>
+              <a:t>4/5/2019</a:t>
             </a:fld>
             <a:endParaRPr lang="en-US"/>
           </a:p>
@@ -1000,7 +1000,7 @@
           <a:p>
             <a:fld id="{365C9929-806C-4F40-9578-CE1B791979AC}" type="datetimeFigureOut">
               <a:rPr lang="en-US" smtClean="0"/>
-              <a:t>4/4/2019</a:t>
+              <a:t>4/5/2019</a:t>
             </a:fld>
             <a:endParaRPr lang="en-US"/>
           </a:p>
@@ -1229,7 +1229,7 @@
           <a:p>
             <a:fld id="{365C9929-806C-4F40-9578-CE1B791979AC}" type="datetimeFigureOut">
               <a:rPr lang="en-US" smtClean="0"/>
-              <a:t>4/4/2019</a:t>
+              <a:t>4/5/2019</a:t>
             </a:fld>
             <a:endParaRPr lang="en-US"/>
           </a:p>
@@ -1593,7 +1593,7 @@
           <a:p>
             <a:fld id="{365C9929-806C-4F40-9578-CE1B791979AC}" type="datetimeFigureOut">
               <a:rPr lang="en-US" smtClean="0"/>
-              <a:t>4/4/2019</a:t>
+              <a:t>4/5/2019</a:t>
             </a:fld>
             <a:endParaRPr lang="en-US"/>
           </a:p>
@@ -1710,7 +1710,7 @@
           <a:p>
             <a:fld id="{365C9929-806C-4F40-9578-CE1B791979AC}" type="datetimeFigureOut">
               <a:rPr lang="en-US" smtClean="0"/>
-              <a:t>4/4/2019</a:t>
+              <a:t>4/5/2019</a:t>
             </a:fld>
             <a:endParaRPr lang="en-US"/>
           </a:p>
@@ -1805,7 +1805,7 @@
           <a:p>
             <a:fld id="{365C9929-806C-4F40-9578-CE1B791979AC}" type="datetimeFigureOut">
               <a:rPr lang="en-US" smtClean="0"/>
-              <a:t>4/4/2019</a:t>
+              <a:t>4/5/2019</a:t>
             </a:fld>
             <a:endParaRPr lang="en-US"/>
           </a:p>
@@ -2080,7 +2080,7 @@
           <a:p>
             <a:fld id="{365C9929-806C-4F40-9578-CE1B791979AC}" type="datetimeFigureOut">
               <a:rPr lang="en-US" smtClean="0"/>
-              <a:t>4/4/2019</a:t>
+              <a:t>4/5/2019</a:t>
             </a:fld>
             <a:endParaRPr lang="en-US"/>
           </a:p>
@@ -2332,7 +2332,7 @@
           <a:p>
             <a:fld id="{365C9929-806C-4F40-9578-CE1B791979AC}" type="datetimeFigureOut">
               <a:rPr lang="en-US" smtClean="0"/>
-              <a:t>4/4/2019</a:t>
+              <a:t>4/5/2019</a:t>
             </a:fld>
             <a:endParaRPr lang="en-US"/>
           </a:p>
@@ -2543,7 +2543,7 @@
           <a:p>
             <a:fld id="{365C9929-806C-4F40-9578-CE1B791979AC}" type="datetimeFigureOut">
               <a:rPr lang="en-US" smtClean="0"/>
-              <a:t>4/4/2019</a:t>
+              <a:t>4/5/2019</a:t>
             </a:fld>
             <a:endParaRPr lang="en-US"/>
           </a:p>
@@ -2963,10 +2963,7 @@
             <a:avLst/>
           </a:prstGeom>
           <a:solidFill>
-            <a:schemeClr val="accent1">
-              <a:lumMod val="60000"/>
-              <a:lumOff val="40000"/>
-            </a:schemeClr>
+            <a:srgbClr val="2794BF"/>
           </a:solidFill>
           <a:ln>
             <a:noFill/>
@@ -3060,10 +3057,7 @@
             <a:avLst/>
           </a:prstGeom>
           <a:solidFill>
-            <a:schemeClr val="accent1">
-              <a:lumMod val="60000"/>
-              <a:lumOff val="40000"/>
-            </a:schemeClr>
+            <a:srgbClr val="2794BF"/>
           </a:solidFill>
           <a:ln>
             <a:noFill/>
@@ -3109,10 +3103,7 @@
             <a:avLst/>
           </a:prstGeom>
           <a:solidFill>
-            <a:schemeClr val="accent1">
-              <a:lumMod val="60000"/>
-              <a:lumOff val="40000"/>
-            </a:schemeClr>
+            <a:srgbClr val="2794BF"/>
           </a:solidFill>
           <a:ln>
             <a:noFill/>
@@ -3500,16 +3491,11 @@
             <a:avLst/>
           </a:prstGeom>
           <a:solidFill>
-            <a:schemeClr val="accent1">
-              <a:lumMod val="20000"/>
-              <a:lumOff val="80000"/>
-            </a:schemeClr>
+            <a:srgbClr val="E3F3F9"/>
           </a:solidFill>
           <a:ln>
             <a:solidFill>
-              <a:schemeClr val="accent1">
-                <a:lumMod val="75000"/>
-              </a:schemeClr>
+              <a:srgbClr val="0081B4"/>
             </a:solidFill>
           </a:ln>
         </p:spPr>
@@ -3680,16 +3666,11 @@
             <a:avLst/>
           </a:prstGeom>
           <a:solidFill>
-            <a:schemeClr val="accent1">
-              <a:lumMod val="20000"/>
-              <a:lumOff val="80000"/>
-            </a:schemeClr>
+            <a:srgbClr val="E3F3F9"/>
           </a:solidFill>
           <a:ln>
             <a:solidFill>
-              <a:schemeClr val="accent1">
-                <a:lumMod val="75000"/>
-              </a:schemeClr>
+              <a:srgbClr val="0081B4"/>
             </a:solidFill>
           </a:ln>
         </p:spPr>
@@ -3830,16 +3811,11 @@
             <a:avLst/>
           </a:prstGeom>
           <a:solidFill>
-            <a:schemeClr val="accent1">
-              <a:lumMod val="20000"/>
-              <a:lumOff val="80000"/>
-            </a:schemeClr>
+            <a:srgbClr val="E3F3F9"/>
           </a:solidFill>
           <a:ln>
             <a:solidFill>
-              <a:schemeClr val="accent1">
-                <a:lumMod val="75000"/>
-              </a:schemeClr>
+              <a:srgbClr val="0081B4"/>
             </a:solidFill>
           </a:ln>
         </p:spPr>
@@ -3976,16 +3952,11 @@
             <a:avLst/>
           </a:prstGeom>
           <a:solidFill>
-            <a:schemeClr val="accent1">
-              <a:lumMod val="20000"/>
-              <a:lumOff val="80000"/>
-            </a:schemeClr>
+            <a:srgbClr val="E3F3F9"/>
           </a:solidFill>
           <a:ln>
             <a:solidFill>
-              <a:schemeClr val="accent1">
-                <a:lumMod val="75000"/>
-              </a:schemeClr>
+              <a:srgbClr val="0081B4"/>
             </a:solidFill>
           </a:ln>
         </p:spPr>
@@ -4504,16 +4475,11 @@
             <a:avLst/>
           </a:prstGeom>
           <a:solidFill>
-            <a:schemeClr val="accent1">
-              <a:lumMod val="20000"/>
-              <a:lumOff val="80000"/>
-            </a:schemeClr>
+            <a:srgbClr val="E3F3F9"/>
           </a:solidFill>
           <a:ln>
             <a:solidFill>
-              <a:schemeClr val="accent1">
-                <a:lumMod val="75000"/>
-              </a:schemeClr>
+              <a:srgbClr val="0081B4"/>
             </a:solidFill>
           </a:ln>
         </p:spPr>
@@ -4665,16 +4631,11 @@
             <a:avLst/>
           </a:prstGeom>
           <a:solidFill>
-            <a:schemeClr val="accent1">
-              <a:lumMod val="20000"/>
-              <a:lumOff val="80000"/>
-            </a:schemeClr>
+            <a:srgbClr val="E3F3F9"/>
           </a:solidFill>
           <a:ln>
             <a:solidFill>
-              <a:schemeClr val="accent1">
-                <a:lumMod val="75000"/>
-              </a:schemeClr>
+              <a:srgbClr val="0081B4"/>
             </a:solidFill>
           </a:ln>
         </p:spPr>
@@ -4832,16 +4793,11 @@
             <a:avLst/>
           </a:prstGeom>
           <a:solidFill>
-            <a:schemeClr val="accent1">
-              <a:lumMod val="20000"/>
-              <a:lumOff val="80000"/>
-            </a:schemeClr>
+            <a:srgbClr val="E3F3F9"/>
           </a:solidFill>
           <a:ln>
             <a:solidFill>
-              <a:schemeClr val="accent1">
-                <a:lumMod val="75000"/>
-              </a:schemeClr>
+              <a:srgbClr val="0081B4"/>
             </a:solidFill>
           </a:ln>
         </p:spPr>
@@ -5008,16 +4964,11 @@
             <a:avLst/>
           </a:prstGeom>
           <a:solidFill>
-            <a:schemeClr val="accent1">
-              <a:lumMod val="20000"/>
-              <a:lumOff val="80000"/>
-            </a:schemeClr>
+            <a:srgbClr val="E3F3F9"/>
           </a:solidFill>
           <a:ln>
             <a:solidFill>
-              <a:schemeClr val="accent1">
-                <a:lumMod val="75000"/>
-              </a:schemeClr>
+              <a:srgbClr val="0081B4"/>
             </a:solidFill>
           </a:ln>
         </p:spPr>
@@ -5189,16 +5140,11 @@
             <a:avLst/>
           </a:prstGeom>
           <a:solidFill>
-            <a:schemeClr val="accent1">
-              <a:lumMod val="20000"/>
-              <a:lumOff val="80000"/>
-            </a:schemeClr>
+            <a:srgbClr val="E3F3F9"/>
           </a:solidFill>
           <a:ln>
             <a:solidFill>
-              <a:schemeClr val="accent1">
-                <a:lumMod val="75000"/>
-              </a:schemeClr>
+              <a:srgbClr val="0081B4"/>
             </a:solidFill>
           </a:ln>
         </p:spPr>
@@ -5587,16 +5533,11 @@
             <a:avLst/>
           </a:prstGeom>
           <a:solidFill>
-            <a:schemeClr val="accent1">
-              <a:lumMod val="20000"/>
-              <a:lumOff val="80000"/>
-            </a:schemeClr>
+            <a:srgbClr val="E3F3F9"/>
           </a:solidFill>
           <a:ln>
             <a:solidFill>
-              <a:schemeClr val="accent1">
-                <a:lumMod val="75000"/>
-              </a:schemeClr>
+              <a:srgbClr val="0081B4"/>
             </a:solidFill>
           </a:ln>
         </p:spPr>
@@ -5668,16 +5609,11 @@
             <a:avLst/>
           </a:prstGeom>
           <a:solidFill>
-            <a:schemeClr val="accent1">
-              <a:lumMod val="20000"/>
-              <a:lumOff val="80000"/>
-            </a:schemeClr>
+            <a:srgbClr val="E3F3F9"/>
           </a:solidFill>
           <a:ln>
             <a:solidFill>
-              <a:schemeClr val="accent1">
-                <a:lumMod val="75000"/>
-              </a:schemeClr>
+              <a:srgbClr val="0081B4"/>
             </a:solidFill>
           </a:ln>
         </p:spPr>
@@ -5871,16 +5807,11 @@
             <a:avLst/>
           </a:prstGeom>
           <a:solidFill>
-            <a:schemeClr val="accent1">
-              <a:lumMod val="20000"/>
-              <a:lumOff val="80000"/>
-            </a:schemeClr>
+            <a:srgbClr val="E3F3F9"/>
           </a:solidFill>
           <a:ln>
             <a:solidFill>
-              <a:schemeClr val="accent1">
-                <a:lumMod val="75000"/>
-              </a:schemeClr>
+              <a:srgbClr val="0081B4"/>
             </a:solidFill>
           </a:ln>
         </p:spPr>

</xml_diff>